<commit_message>
Update to include merchandise
</commit_message>
<xml_diff>
--- a/resources/presentations/owasp-chapter-intro-2021-may.pptx
+++ b/resources/presentations/owasp-chapter-intro-2021-may.pptx
@@ -1888,7 +1888,7 @@
         <p:fade/>
       </p:transition>
     </mc:Choice>
-    <mc:Fallback xmlns="" xmlns:mv="urn:schemas-microsoft-com:mac:vml" xmlns:c="http://schemas.openxmlformats.org/drawingml/2006/chart" xmlns:dgm="http://schemas.openxmlformats.org/drawingml/2006/diagram" xmlns:o="urn:schemas-microsoft-com:office:office" xmlns:v="urn:schemas-microsoft-com:vml" xmlns:pvml="urn:schemas-microsoft-com:office:powerpoint" xmlns:com="http://schemas.openxmlformats.org/drawingml/2006/compatibility" xmlns:p15="http://schemas.microsoft.com/office/powerpoint/2012/main" xmlns:ahyp="http://schemas.microsoft.com/office/drawing/2018/hyperlinkcolor">
+    <mc:Fallback xmlns:ahyp="http://schemas.microsoft.com/office/drawing/2018/hyperlinkcolor" xmlns:p15="http://schemas.microsoft.com/office/powerpoint/2012/main" xmlns:com="http://schemas.openxmlformats.org/drawingml/2006/compatibility" xmlns:pvml="urn:schemas-microsoft-com:office:powerpoint" xmlns:v="urn:schemas-microsoft-com:vml" xmlns:o="urn:schemas-microsoft-com:office:office" xmlns:dgm="http://schemas.openxmlformats.org/drawingml/2006/diagram" xmlns:c="http://schemas.openxmlformats.org/drawingml/2006/chart" xmlns:mv="urn:schemas-microsoft-com:mac:vml" xmlns="">
       <p:transition spd="slow">
         <p:fade/>
       </p:transition>
@@ -2597,7 +2597,7 @@
         <p:fade/>
       </p:transition>
     </mc:Choice>
-    <mc:Fallback xmlns="" xmlns:mv="urn:schemas-microsoft-com:mac:vml" xmlns:c="http://schemas.openxmlformats.org/drawingml/2006/chart" xmlns:dgm="http://schemas.openxmlformats.org/drawingml/2006/diagram" xmlns:o="urn:schemas-microsoft-com:office:office" xmlns:v="urn:schemas-microsoft-com:vml" xmlns:pvml="urn:schemas-microsoft-com:office:powerpoint" xmlns:com="http://schemas.openxmlformats.org/drawingml/2006/compatibility" xmlns:p15="http://schemas.microsoft.com/office/powerpoint/2012/main" xmlns:ahyp="http://schemas.microsoft.com/office/drawing/2018/hyperlinkcolor">
+    <mc:Fallback xmlns:ahyp="http://schemas.microsoft.com/office/drawing/2018/hyperlinkcolor" xmlns:p15="http://schemas.microsoft.com/office/powerpoint/2012/main" xmlns:com="http://schemas.openxmlformats.org/drawingml/2006/compatibility" xmlns:pvml="urn:schemas-microsoft-com:office:powerpoint" xmlns:v="urn:schemas-microsoft-com:vml" xmlns:o="urn:schemas-microsoft-com:office:office" xmlns:dgm="http://schemas.openxmlformats.org/drawingml/2006/diagram" xmlns:c="http://schemas.openxmlformats.org/drawingml/2006/chart" xmlns:mv="urn:schemas-microsoft-com:mac:vml" xmlns="">
       <p:transition spd="slow">
         <p:fade/>
       </p:transition>
@@ -3407,7 +3407,7 @@
         <p:fade/>
       </p:transition>
     </mc:Choice>
-    <mc:Fallback xmlns="" xmlns:mv="urn:schemas-microsoft-com:mac:vml" xmlns:c="http://schemas.openxmlformats.org/drawingml/2006/chart" xmlns:dgm="http://schemas.openxmlformats.org/drawingml/2006/diagram" xmlns:o="urn:schemas-microsoft-com:office:office" xmlns:v="urn:schemas-microsoft-com:vml" xmlns:pvml="urn:schemas-microsoft-com:office:powerpoint" xmlns:com="http://schemas.openxmlformats.org/drawingml/2006/compatibility" xmlns:p15="http://schemas.microsoft.com/office/powerpoint/2012/main" xmlns:ahyp="http://schemas.microsoft.com/office/drawing/2018/hyperlinkcolor">
+    <mc:Fallback xmlns:ahyp="http://schemas.microsoft.com/office/drawing/2018/hyperlinkcolor" xmlns:p15="http://schemas.microsoft.com/office/powerpoint/2012/main" xmlns:com="http://schemas.openxmlformats.org/drawingml/2006/compatibility" xmlns:pvml="urn:schemas-microsoft-com:office:powerpoint" xmlns:v="urn:schemas-microsoft-com:vml" xmlns:o="urn:schemas-microsoft-com:office:office" xmlns:dgm="http://schemas.openxmlformats.org/drawingml/2006/diagram" xmlns:c="http://schemas.openxmlformats.org/drawingml/2006/chart" xmlns:mv="urn:schemas-microsoft-com:mac:vml" xmlns="">
       <p:transition spd="slow">
         <p:fade/>
       </p:transition>
@@ -4303,7 +4303,7 @@
         <p:fade/>
       </p:transition>
     </mc:Choice>
-    <mc:Fallback xmlns="" xmlns:mv="urn:schemas-microsoft-com:mac:vml" xmlns:c="http://schemas.openxmlformats.org/drawingml/2006/chart" xmlns:dgm="http://schemas.openxmlformats.org/drawingml/2006/diagram" xmlns:o="urn:schemas-microsoft-com:office:office" xmlns:v="urn:schemas-microsoft-com:vml" xmlns:pvml="urn:schemas-microsoft-com:office:powerpoint" xmlns:com="http://schemas.openxmlformats.org/drawingml/2006/compatibility" xmlns:p15="http://schemas.microsoft.com/office/powerpoint/2012/main" xmlns:ahyp="http://schemas.microsoft.com/office/drawing/2018/hyperlinkcolor">
+    <mc:Fallback xmlns:ahyp="http://schemas.microsoft.com/office/drawing/2018/hyperlinkcolor" xmlns:p15="http://schemas.microsoft.com/office/powerpoint/2012/main" xmlns:com="http://schemas.openxmlformats.org/drawingml/2006/compatibility" xmlns:pvml="urn:schemas-microsoft-com:office:powerpoint" xmlns:v="urn:schemas-microsoft-com:vml" xmlns:o="urn:schemas-microsoft-com:office:office" xmlns:dgm="http://schemas.openxmlformats.org/drawingml/2006/diagram" xmlns:c="http://schemas.openxmlformats.org/drawingml/2006/chart" xmlns:mv="urn:schemas-microsoft-com:mac:vml" xmlns="">
       <p:transition spd="slow">
         <p:fade/>
       </p:transition>
@@ -5581,7 +5581,7 @@
         <p:fade/>
       </p:transition>
     </mc:Choice>
-    <mc:Fallback xmlns="" xmlns:mv="urn:schemas-microsoft-com:mac:vml" xmlns:c="http://schemas.openxmlformats.org/drawingml/2006/chart" xmlns:dgm="http://schemas.openxmlformats.org/drawingml/2006/diagram" xmlns:o="urn:schemas-microsoft-com:office:office" xmlns:v="urn:schemas-microsoft-com:vml" xmlns:pvml="urn:schemas-microsoft-com:office:powerpoint" xmlns:com="http://schemas.openxmlformats.org/drawingml/2006/compatibility" xmlns:p15="http://schemas.microsoft.com/office/powerpoint/2012/main" xmlns:ahyp="http://schemas.microsoft.com/office/drawing/2018/hyperlinkcolor">
+    <mc:Fallback xmlns:ahyp="http://schemas.microsoft.com/office/drawing/2018/hyperlinkcolor" xmlns:p15="http://schemas.microsoft.com/office/powerpoint/2012/main" xmlns:com="http://schemas.openxmlformats.org/drawingml/2006/compatibility" xmlns:pvml="urn:schemas-microsoft-com:office:powerpoint" xmlns:v="urn:schemas-microsoft-com:vml" xmlns:o="urn:schemas-microsoft-com:office:office" xmlns:dgm="http://schemas.openxmlformats.org/drawingml/2006/diagram" xmlns:c="http://schemas.openxmlformats.org/drawingml/2006/chart" xmlns:mv="urn:schemas-microsoft-com:mac:vml" xmlns="">
       <p:transition spd="slow">
         <p:fade/>
       </p:transition>
@@ -6103,7 +6103,7 @@
         <p:fade/>
       </p:transition>
     </mc:Choice>
-    <mc:Fallback xmlns="" xmlns:mv="urn:schemas-microsoft-com:mac:vml" xmlns:c="http://schemas.openxmlformats.org/drawingml/2006/chart" xmlns:dgm="http://schemas.openxmlformats.org/drawingml/2006/diagram" xmlns:o="urn:schemas-microsoft-com:office:office" xmlns:v="urn:schemas-microsoft-com:vml" xmlns:pvml="urn:schemas-microsoft-com:office:powerpoint" xmlns:com="http://schemas.openxmlformats.org/drawingml/2006/compatibility" xmlns:p15="http://schemas.microsoft.com/office/powerpoint/2012/main" xmlns:ahyp="http://schemas.microsoft.com/office/drawing/2018/hyperlinkcolor">
+    <mc:Fallback xmlns:ahyp="http://schemas.microsoft.com/office/drawing/2018/hyperlinkcolor" xmlns:p15="http://schemas.microsoft.com/office/powerpoint/2012/main" xmlns:com="http://schemas.openxmlformats.org/drawingml/2006/compatibility" xmlns:pvml="urn:schemas-microsoft-com:office:powerpoint" xmlns:v="urn:schemas-microsoft-com:vml" xmlns:o="urn:schemas-microsoft-com:office:office" xmlns:dgm="http://schemas.openxmlformats.org/drawingml/2006/diagram" xmlns:c="http://schemas.openxmlformats.org/drawingml/2006/chart" xmlns:mv="urn:schemas-microsoft-com:mac:vml" xmlns="">
       <p:transition spd="slow">
         <p:fade/>
       </p:transition>
@@ -6485,7 +6485,7 @@
         <p:fade/>
       </p:transition>
     </mc:Choice>
-    <mc:Fallback xmlns="" xmlns:mv="urn:schemas-microsoft-com:mac:vml" xmlns:c="http://schemas.openxmlformats.org/drawingml/2006/chart" xmlns:dgm="http://schemas.openxmlformats.org/drawingml/2006/diagram" xmlns:o="urn:schemas-microsoft-com:office:office" xmlns:v="urn:schemas-microsoft-com:vml" xmlns:pvml="urn:schemas-microsoft-com:office:powerpoint" xmlns:com="http://schemas.openxmlformats.org/drawingml/2006/compatibility" xmlns:p15="http://schemas.microsoft.com/office/powerpoint/2012/main" xmlns:ahyp="http://schemas.microsoft.com/office/drawing/2018/hyperlinkcolor">
+    <mc:Fallback xmlns:ahyp="http://schemas.microsoft.com/office/drawing/2018/hyperlinkcolor" xmlns:p15="http://schemas.microsoft.com/office/powerpoint/2012/main" xmlns:com="http://schemas.openxmlformats.org/drawingml/2006/compatibility" xmlns:pvml="urn:schemas-microsoft-com:office:powerpoint" xmlns:v="urn:schemas-microsoft-com:vml" xmlns:o="urn:schemas-microsoft-com:office:office" xmlns:dgm="http://schemas.openxmlformats.org/drawingml/2006/diagram" xmlns:c="http://schemas.openxmlformats.org/drawingml/2006/chart" xmlns:mv="urn:schemas-microsoft-com:mac:vml" xmlns="">
       <p:transition spd="slow">
         <p:fade/>
       </p:transition>
@@ -6660,7 +6660,7 @@
         <p:fade/>
       </p:transition>
     </mc:Choice>
-    <mc:Fallback xmlns="" xmlns:mv="urn:schemas-microsoft-com:mac:vml" xmlns:c="http://schemas.openxmlformats.org/drawingml/2006/chart" xmlns:dgm="http://schemas.openxmlformats.org/drawingml/2006/diagram" xmlns:o="urn:schemas-microsoft-com:office:office" xmlns:v="urn:schemas-microsoft-com:vml" xmlns:pvml="urn:schemas-microsoft-com:office:powerpoint" xmlns:com="http://schemas.openxmlformats.org/drawingml/2006/compatibility" xmlns:p15="http://schemas.microsoft.com/office/powerpoint/2012/main" xmlns:ahyp="http://schemas.microsoft.com/office/drawing/2018/hyperlinkcolor">
+    <mc:Fallback xmlns:ahyp="http://schemas.microsoft.com/office/drawing/2018/hyperlinkcolor" xmlns:p15="http://schemas.microsoft.com/office/powerpoint/2012/main" xmlns:com="http://schemas.openxmlformats.org/drawingml/2006/compatibility" xmlns:pvml="urn:schemas-microsoft-com:office:powerpoint" xmlns:v="urn:schemas-microsoft-com:vml" xmlns:o="urn:schemas-microsoft-com:office:office" xmlns:dgm="http://schemas.openxmlformats.org/drawingml/2006/diagram" xmlns:c="http://schemas.openxmlformats.org/drawingml/2006/chart" xmlns:mv="urn:schemas-microsoft-com:mac:vml" xmlns="">
       <p:transition spd="slow">
         <p:fade/>
       </p:transition>
@@ -7637,7 +7637,7 @@
         <p:fade/>
       </p:transition>
     </mc:Choice>
-    <mc:Fallback xmlns="" xmlns:mv="urn:schemas-microsoft-com:mac:vml" xmlns:c="http://schemas.openxmlformats.org/drawingml/2006/chart" xmlns:dgm="http://schemas.openxmlformats.org/drawingml/2006/diagram" xmlns:o="urn:schemas-microsoft-com:office:office" xmlns:v="urn:schemas-microsoft-com:vml" xmlns:pvml="urn:schemas-microsoft-com:office:powerpoint" xmlns:com="http://schemas.openxmlformats.org/drawingml/2006/compatibility" xmlns:p15="http://schemas.microsoft.com/office/powerpoint/2012/main" xmlns:ahyp="http://schemas.microsoft.com/office/drawing/2018/hyperlinkcolor">
+    <mc:Fallback xmlns:ahyp="http://schemas.microsoft.com/office/drawing/2018/hyperlinkcolor" xmlns:p15="http://schemas.microsoft.com/office/powerpoint/2012/main" xmlns:com="http://schemas.openxmlformats.org/drawingml/2006/compatibility" xmlns:pvml="urn:schemas-microsoft-com:office:powerpoint" xmlns:v="urn:schemas-microsoft-com:vml" xmlns:o="urn:schemas-microsoft-com:office:office" xmlns:dgm="http://schemas.openxmlformats.org/drawingml/2006/diagram" xmlns:c="http://schemas.openxmlformats.org/drawingml/2006/chart" xmlns:mv="urn:schemas-microsoft-com:mac:vml" xmlns="">
       <p:transition spd="slow">
         <p:fade/>
       </p:transition>
@@ -8303,7 +8303,7 @@
         <p:fade/>
       </p:transition>
     </mc:Choice>
-    <mc:Fallback xmlns="" xmlns:mv="urn:schemas-microsoft-com:mac:vml" xmlns:c="http://schemas.openxmlformats.org/drawingml/2006/chart" xmlns:dgm="http://schemas.openxmlformats.org/drawingml/2006/diagram" xmlns:o="urn:schemas-microsoft-com:office:office" xmlns:v="urn:schemas-microsoft-com:vml" xmlns:pvml="urn:schemas-microsoft-com:office:powerpoint" xmlns:com="http://schemas.openxmlformats.org/drawingml/2006/compatibility" xmlns:p15="http://schemas.microsoft.com/office/powerpoint/2012/main" xmlns:ahyp="http://schemas.microsoft.com/office/drawing/2018/hyperlinkcolor">
+    <mc:Fallback xmlns:ahyp="http://schemas.microsoft.com/office/drawing/2018/hyperlinkcolor" xmlns:p15="http://schemas.microsoft.com/office/powerpoint/2012/main" xmlns:com="http://schemas.openxmlformats.org/drawingml/2006/compatibility" xmlns:pvml="urn:schemas-microsoft-com:office:powerpoint" xmlns:v="urn:schemas-microsoft-com:vml" xmlns:o="urn:schemas-microsoft-com:office:office" xmlns:dgm="http://schemas.openxmlformats.org/drawingml/2006/diagram" xmlns:c="http://schemas.openxmlformats.org/drawingml/2006/chart" xmlns:mv="urn:schemas-microsoft-com:mac:vml" xmlns="">
       <p:transition spd="slow">
         <p:fade/>
       </p:transition>
@@ -9263,7 +9263,7 @@
         <p:spPr>
           <a:xfrm>
             <a:off x="647225" y="1767425"/>
-            <a:ext cx="10081800" cy="2723792"/>
+            <a:ext cx="10081800" cy="3739455"/>
           </a:xfrm>
           <a:prstGeom prst="rect">
             <a:avLst/>
@@ -9279,6 +9279,20 @@
           </a:bodyPr>
           <a:lstStyle/>
           <a:p>
+            <a:pPr marL="457200" indent="-368300">
+              <a:lnSpc>
+                <a:spcPct val="150000"/>
+              </a:lnSpc>
+              <a:buSzPts val="2200"/>
+              <a:buFont typeface="Arial"/>
+              <a:buChar char="●"/>
+            </a:pPr>
+            <a:r>
+              <a:rPr lang="en-US" sz="2200"/>
+              <a:t>Chapter Reactivation Program is complete</a:t>
+            </a:r>
+          </a:p>
+          <a:p>
             <a:pPr marL="457200" lvl="0" indent="-368300" algn="l" rtl="0">
               <a:lnSpc>
                 <a:spcPct val="150000"/>
@@ -9293,45 +9307,60 @@
               <a:buChar char="●"/>
             </a:pPr>
             <a:r>
+              <a:rPr lang="en-US" sz="2200"/>
+              <a:t>OWASP </a:t>
+            </a:r>
+            <a:r>
               <a:rPr lang="en-US" sz="2200" dirty="0"/>
-              <a:t>Chapter Reactivation Program is complete</a:t>
+              <a:t>Merchandise Fundraising Store is open!</a:t>
             </a:r>
-            <a:endParaRPr sz="2200" dirty="0"/>
+            <a:br>
+              <a:rPr lang="en-US" sz="2200" dirty="0"/>
+            </a:br>
+            <a:r>
+              <a:rPr lang="en-US" sz="2200" dirty="0">
+                <a:hlinkClick r:id="rId3"/>
+              </a:rPr>
+              <a:t>https://www.zazzle.com/s/owasp_foundation</a:t>
+            </a:r>
+            <a:r>
+              <a:rPr lang="en-US" sz="2200" dirty="0"/>
+              <a:t> </a:t>
+            </a:r>
           </a:p>
           <a:p>
-            <a:pPr marL="457200" lvl="0" indent="-368300" algn="l" rtl="0">
+            <a:pPr marL="457200" indent="-368300">
               <a:lnSpc>
                 <a:spcPct val="150000"/>
               </a:lnSpc>
-              <a:spcBef>
-                <a:spcPts val="0"/>
-              </a:spcBef>
-              <a:spcAft>
-                <a:spcPts val="0"/>
-              </a:spcAft>
               <a:buSzPts val="2200"/>
-              <a:buFont typeface="Calibri"/>
+              <a:buFont typeface="Arial"/>
               <a:buChar char="●"/>
             </a:pPr>
             <a:r>
-              <a:rPr lang="en-US" sz="2200" u="sng" dirty="0">
-                <a:solidFill>
-                  <a:schemeClr val="hlink"/>
-                </a:solidFill>
-                <a:latin typeface="Calibri"/>
-                <a:ea typeface="Calibri"/>
-                <a:cs typeface="Calibri"/>
+              <a:rPr lang="en-US" sz="2200" dirty="0">
                 <a:sym typeface="Calibri"/>
-                <a:hlinkClick r:id="rId3"/>
               </a:rPr>
-              <a:t>OWASP 20th Anniversary</a:t>
+              <a:t>OWASP 20th Anniversary is soon to announce keynotes!</a:t>
             </a:r>
-            <a:endParaRPr sz="2200" dirty="0">
-              <a:latin typeface="Calibri"/>
-              <a:ea typeface="Calibri"/>
-              <a:cs typeface="Calibri"/>
-              <a:sym typeface="Calibri"/>
-            </a:endParaRPr>
+            <a:br>
+              <a:rPr lang="en-US" sz="2200" dirty="0">
+                <a:sym typeface="Calibri"/>
+              </a:rPr>
+            </a:br>
+            <a:r>
+              <a:rPr lang="en-US" sz="2200" dirty="0">
+                <a:sym typeface="Calibri"/>
+                <a:hlinkClick r:id="rId4"/>
+              </a:rPr>
+              <a:t>https://20thanniversary.owasp.org/</a:t>
+            </a:r>
+            <a:r>
+              <a:rPr lang="en-US" sz="2200" dirty="0">
+                <a:sym typeface="Calibri"/>
+              </a:rPr>
+              <a:t> </a:t>
+            </a:r>
           </a:p>
           <a:p>
             <a:pPr marL="457200" lvl="0" indent="-368300" algn="l" rtl="0">
@@ -9355,32 +9384,7 @@
                 <a:cs typeface="Calibri"/>
                 <a:sym typeface="Calibri"/>
               </a:rPr>
-              <a:t>More local, regional, and global events and activities</a:t>
-            </a:r>
-          </a:p>
-          <a:p>
-            <a:pPr marL="457200" lvl="0" indent="-368300" algn="l" rtl="0">
-              <a:lnSpc>
-                <a:spcPct val="150000"/>
-              </a:lnSpc>
-              <a:spcBef>
-                <a:spcPts val="0"/>
-              </a:spcBef>
-              <a:spcAft>
-                <a:spcPts val="0"/>
-              </a:spcAft>
-              <a:buSzPts val="2200"/>
-              <a:buFont typeface="Calibri"/>
-              <a:buChar char="●"/>
-            </a:pPr>
-            <a:r>
-              <a:rPr lang="en-US" sz="2200" dirty="0">
-                <a:latin typeface="Calibri"/>
-                <a:ea typeface="Calibri"/>
-                <a:cs typeface="Calibri"/>
-                <a:sym typeface="Calibri"/>
-              </a:rPr>
-              <a:t>LASCON is coming up!</a:t>
+              <a:t>So many local, regional, and global events and activities</a:t>
             </a:r>
           </a:p>
           <a:p>
@@ -9423,7 +9427,7 @@
           <p:nvPr/>
         </p:nvPicPr>
         <p:blipFill>
-          <a:blip r:embed="rId4">
+          <a:blip r:embed="rId5">
             <a:alphaModFix/>
           </a:blip>
           <a:stretch>
@@ -9451,7 +9455,7 @@
           <p:nvPr/>
         </p:nvPicPr>
         <p:blipFill>
-          <a:blip r:embed="rId5">
+          <a:blip r:embed="rId6">
             <a:alphaModFix/>
           </a:blip>
           <a:stretch>
@@ -10397,7 +10401,7 @@
         <p:fade/>
       </p:transition>
     </mc:Choice>
-    <mc:Fallback xmlns="" xmlns:mv="urn:schemas-microsoft-com:mac:vml" xmlns:c="http://schemas.openxmlformats.org/drawingml/2006/chart" xmlns:dgm="http://schemas.openxmlformats.org/drawingml/2006/diagram" xmlns:o="urn:schemas-microsoft-com:office:office" xmlns:v="urn:schemas-microsoft-com:vml" xmlns:pvml="urn:schemas-microsoft-com:office:powerpoint" xmlns:com="http://schemas.openxmlformats.org/drawingml/2006/compatibility" xmlns:p15="http://schemas.microsoft.com/office/powerpoint/2012/main" xmlns:ahyp="http://schemas.microsoft.com/office/drawing/2018/hyperlinkcolor">
+    <mc:Fallback xmlns:ahyp="http://schemas.microsoft.com/office/drawing/2018/hyperlinkcolor" xmlns:p15="http://schemas.microsoft.com/office/powerpoint/2012/main" xmlns:com="http://schemas.openxmlformats.org/drawingml/2006/compatibility" xmlns:pvml="urn:schemas-microsoft-com:office:powerpoint" xmlns:v="urn:schemas-microsoft-com:vml" xmlns:o="urn:schemas-microsoft-com:office:office" xmlns:dgm="http://schemas.openxmlformats.org/drawingml/2006/diagram" xmlns:c="http://schemas.openxmlformats.org/drawingml/2006/chart" xmlns:mv="urn:schemas-microsoft-com:mac:vml" xmlns="">
       <p:transition spd="slow">
         <p:fade/>
       </p:transition>
@@ -10506,7 +10510,7 @@
         <p:fade/>
       </p:transition>
     </mc:Choice>
-    <mc:Fallback xmlns="" xmlns:mv="urn:schemas-microsoft-com:mac:vml" xmlns:c="http://schemas.openxmlformats.org/drawingml/2006/chart" xmlns:dgm="http://schemas.openxmlformats.org/drawingml/2006/diagram" xmlns:o="urn:schemas-microsoft-com:office:office" xmlns:v="urn:schemas-microsoft-com:vml" xmlns:pvml="urn:schemas-microsoft-com:office:powerpoint" xmlns:com="http://schemas.openxmlformats.org/drawingml/2006/compatibility" xmlns:p15="http://schemas.microsoft.com/office/powerpoint/2012/main" xmlns:ahyp="http://schemas.microsoft.com/office/drawing/2018/hyperlinkcolor">
+    <mc:Fallback xmlns:ahyp="http://schemas.microsoft.com/office/drawing/2018/hyperlinkcolor" xmlns:p15="http://schemas.microsoft.com/office/powerpoint/2012/main" xmlns:com="http://schemas.openxmlformats.org/drawingml/2006/compatibility" xmlns:pvml="urn:schemas-microsoft-com:office:powerpoint" xmlns:v="urn:schemas-microsoft-com:vml" xmlns:o="urn:schemas-microsoft-com:office:office" xmlns:dgm="http://schemas.openxmlformats.org/drawingml/2006/diagram" xmlns:c="http://schemas.openxmlformats.org/drawingml/2006/chart" xmlns:mv="urn:schemas-microsoft-com:mac:vml" xmlns="">
       <p:transition spd="slow">
         <p:fade/>
       </p:transition>
@@ -11000,7 +11004,7 @@
         <p:fade/>
       </p:transition>
     </mc:Choice>
-    <mc:Fallback xmlns="" xmlns:mv="urn:schemas-microsoft-com:mac:vml" xmlns:c="http://schemas.openxmlformats.org/drawingml/2006/chart" xmlns:dgm="http://schemas.openxmlformats.org/drawingml/2006/diagram" xmlns:o="urn:schemas-microsoft-com:office:office" xmlns:v="urn:schemas-microsoft-com:vml" xmlns:pvml="urn:schemas-microsoft-com:office:powerpoint" xmlns:com="http://schemas.openxmlformats.org/drawingml/2006/compatibility" xmlns:p15="http://schemas.microsoft.com/office/powerpoint/2012/main" xmlns:ahyp="http://schemas.microsoft.com/office/drawing/2018/hyperlinkcolor">
+    <mc:Fallback xmlns:ahyp="http://schemas.microsoft.com/office/drawing/2018/hyperlinkcolor" xmlns:p15="http://schemas.microsoft.com/office/powerpoint/2012/main" xmlns:com="http://schemas.openxmlformats.org/drawingml/2006/compatibility" xmlns:pvml="urn:schemas-microsoft-com:office:powerpoint" xmlns:v="urn:schemas-microsoft-com:vml" xmlns:o="urn:schemas-microsoft-com:office:office" xmlns:dgm="http://schemas.openxmlformats.org/drawingml/2006/diagram" xmlns:c="http://schemas.openxmlformats.org/drawingml/2006/chart" xmlns:mv="urn:schemas-microsoft-com:mac:vml" xmlns="">
       <p:transition spd="slow">
         <p:fade/>
       </p:transition>
@@ -11441,7 +11445,7 @@
         <p:fade/>
       </p:transition>
     </mc:Choice>
-    <mc:Fallback xmlns="" xmlns:mv="urn:schemas-microsoft-com:mac:vml" xmlns:c="http://schemas.openxmlformats.org/drawingml/2006/chart" xmlns:dgm="http://schemas.openxmlformats.org/drawingml/2006/diagram" xmlns:o="urn:schemas-microsoft-com:office:office" xmlns:v="urn:schemas-microsoft-com:vml" xmlns:pvml="urn:schemas-microsoft-com:office:powerpoint" xmlns:com="http://schemas.openxmlformats.org/drawingml/2006/compatibility" xmlns:p15="http://schemas.microsoft.com/office/powerpoint/2012/main" xmlns:ahyp="http://schemas.microsoft.com/office/drawing/2018/hyperlinkcolor">
+    <mc:Fallback xmlns:ahyp="http://schemas.microsoft.com/office/drawing/2018/hyperlinkcolor" xmlns:p15="http://schemas.microsoft.com/office/powerpoint/2012/main" xmlns:com="http://schemas.openxmlformats.org/drawingml/2006/compatibility" xmlns:pvml="urn:schemas-microsoft-com:office:powerpoint" xmlns:v="urn:schemas-microsoft-com:vml" xmlns:o="urn:schemas-microsoft-com:office:office" xmlns:dgm="http://schemas.openxmlformats.org/drawingml/2006/diagram" xmlns:c="http://schemas.openxmlformats.org/drawingml/2006/chart" xmlns:mv="urn:schemas-microsoft-com:mac:vml" xmlns="">
       <p:transition spd="slow">
         <p:fade/>
       </p:transition>

</xml_diff>